<commit_message>
Making changes to Jedi Graph
Adding the switch Intelligence label which was missing in the Jedi Graph
and creating the combined graph
</commit_message>
<xml_diff>
--- a/topology/Network Diagram.pptx
+++ b/topology/Network Diagram.pptx
@@ -105,6 +105,11 @@
       </a:defRPr>
     </a:lvl9pPr>
   </p:defaultTextStyle>
+  <p:extLst>
+    <p:ext uri="{EFAFB233-063F-42B5-8137-9DF3F51BA10A}">
+      <p15:sldGuideLst xmlns:p15="http://schemas.microsoft.com/office/powerpoint/2012/main"/>
+    </p:ext>
+  </p:extLst>
 </p:presentation>
 </file>
 
@@ -239,7 +244,7 @@
           <a:p>
             <a:fld id="{A716AE65-BF48-4172-919C-67991797D36F}" type="datetimeFigureOut">
               <a:rPr lang="en-US" smtClean="0"/>
-              <a:t>12/2/2015</a:t>
+              <a:t>12/3/2015</a:t>
             </a:fld>
             <a:endParaRPr lang="en-US"/>
           </a:p>
@@ -409,7 +414,7 @@
           <a:p>
             <a:fld id="{A716AE65-BF48-4172-919C-67991797D36F}" type="datetimeFigureOut">
               <a:rPr lang="en-US" smtClean="0"/>
-              <a:t>12/2/2015</a:t>
+              <a:t>12/3/2015</a:t>
             </a:fld>
             <a:endParaRPr lang="en-US"/>
           </a:p>
@@ -589,7 +594,7 @@
           <a:p>
             <a:fld id="{A716AE65-BF48-4172-919C-67991797D36F}" type="datetimeFigureOut">
               <a:rPr lang="en-US" smtClean="0"/>
-              <a:t>12/2/2015</a:t>
+              <a:t>12/3/2015</a:t>
             </a:fld>
             <a:endParaRPr lang="en-US"/>
           </a:p>
@@ -759,7 +764,7 @@
           <a:p>
             <a:fld id="{A716AE65-BF48-4172-919C-67991797D36F}" type="datetimeFigureOut">
               <a:rPr lang="en-US" smtClean="0"/>
-              <a:t>12/2/2015</a:t>
+              <a:t>12/3/2015</a:t>
             </a:fld>
             <a:endParaRPr lang="en-US"/>
           </a:p>
@@ -1005,7 +1010,7 @@
           <a:p>
             <a:fld id="{A716AE65-BF48-4172-919C-67991797D36F}" type="datetimeFigureOut">
               <a:rPr lang="en-US" smtClean="0"/>
-              <a:t>12/2/2015</a:t>
+              <a:t>12/3/2015</a:t>
             </a:fld>
             <a:endParaRPr lang="en-US"/>
           </a:p>
@@ -1237,7 +1242,7 @@
           <a:p>
             <a:fld id="{A716AE65-BF48-4172-919C-67991797D36F}" type="datetimeFigureOut">
               <a:rPr lang="en-US" smtClean="0"/>
-              <a:t>12/2/2015</a:t>
+              <a:t>12/3/2015</a:t>
             </a:fld>
             <a:endParaRPr lang="en-US"/>
           </a:p>
@@ -1604,7 +1609,7 @@
           <a:p>
             <a:fld id="{A716AE65-BF48-4172-919C-67991797D36F}" type="datetimeFigureOut">
               <a:rPr lang="en-US" smtClean="0"/>
-              <a:t>12/2/2015</a:t>
+              <a:t>12/3/2015</a:t>
             </a:fld>
             <a:endParaRPr lang="en-US"/>
           </a:p>
@@ -1722,7 +1727,7 @@
           <a:p>
             <a:fld id="{A716AE65-BF48-4172-919C-67991797D36F}" type="datetimeFigureOut">
               <a:rPr lang="en-US" smtClean="0"/>
-              <a:t>12/2/2015</a:t>
+              <a:t>12/3/2015</a:t>
             </a:fld>
             <a:endParaRPr lang="en-US"/>
           </a:p>
@@ -1817,7 +1822,7 @@
           <a:p>
             <a:fld id="{A716AE65-BF48-4172-919C-67991797D36F}" type="datetimeFigureOut">
               <a:rPr lang="en-US" smtClean="0"/>
-              <a:t>12/2/2015</a:t>
+              <a:t>12/3/2015</a:t>
             </a:fld>
             <a:endParaRPr lang="en-US"/>
           </a:p>
@@ -2094,7 +2099,7 @@
           <a:p>
             <a:fld id="{A716AE65-BF48-4172-919C-67991797D36F}" type="datetimeFigureOut">
               <a:rPr lang="en-US" smtClean="0"/>
-              <a:t>12/2/2015</a:t>
+              <a:t>12/3/2015</a:t>
             </a:fld>
             <a:endParaRPr lang="en-US"/>
           </a:p>
@@ -2347,7 +2352,7 @@
           <a:p>
             <a:fld id="{A716AE65-BF48-4172-919C-67991797D36F}" type="datetimeFigureOut">
               <a:rPr lang="en-US" smtClean="0"/>
-              <a:t>12/2/2015</a:t>
+              <a:t>12/3/2015</a:t>
             </a:fld>
             <a:endParaRPr lang="en-US"/>
           </a:p>
@@ -2560,7 +2565,7 @@
           <a:p>
             <a:fld id="{A716AE65-BF48-4172-919C-67991797D36F}" type="datetimeFigureOut">
               <a:rPr lang="en-US" smtClean="0"/>
-              <a:t>12/2/2015</a:t>
+              <a:t>12/3/2015</a:t>
             </a:fld>
             <a:endParaRPr lang="en-US"/>
           </a:p>
@@ -7750,6 +7755,44 @@
             <a:r>
               <a:rPr lang="en-US" dirty="0" smtClean="0"/>
               <a:t>Plane</a:t>
+            </a:r>
+            <a:endParaRPr lang="en-US" dirty="0"/>
+          </a:p>
+        </p:txBody>
+      </p:sp>
+      <p:sp>
+        <p:nvSpPr>
+          <p:cNvPr id="92" name="TextBox 91"/>
+          <p:cNvSpPr txBox="1"/>
+          <p:nvPr/>
+        </p:nvSpPr>
+        <p:spPr>
+          <a:xfrm>
+            <a:off x="829062" y="2846169"/>
+            <a:ext cx="1957659" cy="646331"/>
+          </a:xfrm>
+          <a:prstGeom prst="rect">
+            <a:avLst/>
+          </a:prstGeom>
+          <a:noFill/>
+        </p:spPr>
+        <p:txBody>
+          <a:bodyPr wrap="square" rtlCol="0">
+            <a:spAutoFit/>
+          </a:bodyPr>
+          <a:lstStyle/>
+          <a:p>
+            <a:pPr algn="ctr"/>
+            <a:r>
+              <a:rPr lang="en-US" dirty="0" smtClean="0"/>
+              <a:t>Switch Intelligence</a:t>
+            </a:r>
+          </a:p>
+          <a:p>
+            <a:pPr algn="ctr"/>
+            <a:r>
+              <a:rPr lang="en-US" dirty="0" smtClean="0"/>
+              <a:t>Layer</a:t>
             </a:r>
             <a:endParaRPr lang="en-US" dirty="0"/>
           </a:p>

</xml_diff>